<commit_message>
Added new Presentation from March 2018 LonPSUG
</commit_message>
<xml_diff>
--- a/Teaching The It Pro How to Dev/Teaching the ITPro how to Dev.pptx
+++ b/Teaching The It Pro How to Dev/Teaching the ITPro how to Dev.pptx
@@ -210,7 +210,7 @@
           <a:p>
             <a:fld id="{3D7368E2-82AA-4A5C-9CBF-886E427DDC40}" type="datetimeFigureOut">
               <a:rPr lang="en-GB" smtClean="0"/>
-              <a:t>24/10/2016</a:t>
+              <a:t>15/07/2017</a:t>
             </a:fld>
             <a:endParaRPr lang="en-GB"/>
           </a:p>
@@ -693,7 +693,7 @@
           <a:p>
             <a:fld id="{D8D374B1-36E8-4293-89C8-B45A6D7B3AE1}" type="datetimeFigureOut">
               <a:rPr lang="en-GB" smtClean="0"/>
-              <a:t>24/10/2016</a:t>
+              <a:t>15/07/2017</a:t>
             </a:fld>
             <a:endParaRPr lang="en-GB" dirty="0"/>
           </a:p>
@@ -863,7 +863,7 @@
           <a:p>
             <a:fld id="{D8D374B1-36E8-4293-89C8-B45A6D7B3AE1}" type="datetimeFigureOut">
               <a:rPr lang="en-GB" smtClean="0"/>
-              <a:t>24/10/2016</a:t>
+              <a:t>15/07/2017</a:t>
             </a:fld>
             <a:endParaRPr lang="en-GB" dirty="0"/>
           </a:p>
@@ -1043,7 +1043,7 @@
           <a:p>
             <a:fld id="{D8D374B1-36E8-4293-89C8-B45A6D7B3AE1}" type="datetimeFigureOut">
               <a:rPr lang="en-GB" smtClean="0"/>
-              <a:t>24/10/2016</a:t>
+              <a:t>15/07/2017</a:t>
             </a:fld>
             <a:endParaRPr lang="en-GB" dirty="0"/>
           </a:p>
@@ -1213,7 +1213,7 @@
           <a:p>
             <a:fld id="{D8D374B1-36E8-4293-89C8-B45A6D7B3AE1}" type="datetimeFigureOut">
               <a:rPr lang="en-GB" smtClean="0"/>
-              <a:t>24/10/2016</a:t>
+              <a:t>15/07/2017</a:t>
             </a:fld>
             <a:endParaRPr lang="en-GB" dirty="0"/>
           </a:p>
@@ -1459,7 +1459,7 @@
           <a:p>
             <a:fld id="{D8D374B1-36E8-4293-89C8-B45A6D7B3AE1}" type="datetimeFigureOut">
               <a:rPr lang="en-GB" smtClean="0"/>
-              <a:t>24/10/2016</a:t>
+              <a:t>15/07/2017</a:t>
             </a:fld>
             <a:endParaRPr lang="en-GB" dirty="0"/>
           </a:p>
@@ -1691,7 +1691,7 @@
           <a:p>
             <a:fld id="{D8D374B1-36E8-4293-89C8-B45A6D7B3AE1}" type="datetimeFigureOut">
               <a:rPr lang="en-GB" smtClean="0"/>
-              <a:t>24/10/2016</a:t>
+              <a:t>15/07/2017</a:t>
             </a:fld>
             <a:endParaRPr lang="en-GB" dirty="0"/>
           </a:p>
@@ -2058,7 +2058,7 @@
           <a:p>
             <a:fld id="{D8D374B1-36E8-4293-89C8-B45A6D7B3AE1}" type="datetimeFigureOut">
               <a:rPr lang="en-GB" smtClean="0"/>
-              <a:t>24/10/2016</a:t>
+              <a:t>15/07/2017</a:t>
             </a:fld>
             <a:endParaRPr lang="en-GB" dirty="0"/>
           </a:p>
@@ -2176,7 +2176,7 @@
           <a:p>
             <a:fld id="{D8D374B1-36E8-4293-89C8-B45A6D7B3AE1}" type="datetimeFigureOut">
               <a:rPr lang="en-GB" smtClean="0"/>
-              <a:t>24/10/2016</a:t>
+              <a:t>15/07/2017</a:t>
             </a:fld>
             <a:endParaRPr lang="en-GB" dirty="0"/>
           </a:p>
@@ -2271,7 +2271,7 @@
           <a:p>
             <a:fld id="{D8D374B1-36E8-4293-89C8-B45A6D7B3AE1}" type="datetimeFigureOut">
               <a:rPr lang="en-GB" smtClean="0"/>
-              <a:t>24/10/2016</a:t>
+              <a:t>15/07/2017</a:t>
             </a:fld>
             <a:endParaRPr lang="en-GB" dirty="0"/>
           </a:p>
@@ -2548,7 +2548,7 @@
           <a:p>
             <a:fld id="{D8D374B1-36E8-4293-89C8-B45A6D7B3AE1}" type="datetimeFigureOut">
               <a:rPr lang="en-GB" smtClean="0"/>
-              <a:t>24/10/2016</a:t>
+              <a:t>15/07/2017</a:t>
             </a:fld>
             <a:endParaRPr lang="en-GB" dirty="0"/>
           </a:p>
@@ -2801,7 +2801,7 @@
           <a:p>
             <a:fld id="{D8D374B1-36E8-4293-89C8-B45A6D7B3AE1}" type="datetimeFigureOut">
               <a:rPr lang="en-GB" smtClean="0"/>
-              <a:t>24/10/2016</a:t>
+              <a:t>15/07/2017</a:t>
             </a:fld>
             <a:endParaRPr lang="en-GB" dirty="0"/>
           </a:p>
@@ -3014,7 +3014,7 @@
           <a:p>
             <a:fld id="{D8D374B1-36E8-4293-89C8-B45A6D7B3AE1}" type="datetimeFigureOut">
               <a:rPr lang="en-GB" smtClean="0"/>
-              <a:t>24/10/2016</a:t>
+              <a:t>15/07/2017</a:t>
             </a:fld>
             <a:endParaRPr lang="en-GB" dirty="0"/>
           </a:p>
@@ -4208,7 +4208,6 @@
               <a:rPr lang="en-GB" dirty="0"/>
               <a:t>PSScriptAnalyzer</a:t>
             </a:r>
-            <a:endParaRPr lang="en-GB" dirty="0"/>
           </a:p>
         </p:txBody>
       </p:sp>
@@ -5618,7 +5617,7 @@
           <a:p>
             <a:r>
               <a:rPr lang="en-GB" sz="2400" dirty="0"/>
-              <a:t>Ryan Yates – 26 &amp; a Microsoft Cloud &amp; </a:t>
+              <a:t>Ryan Yates – 27 &amp; a Microsoft Cloud &amp; </a:t>
             </a:r>
             <a:r>
               <a:rPr lang="en-GB" sz="2400" dirty="0" err="1"/>

</xml_diff>